<commit_message>
Added a result slide about computation times.
</commit_message>
<xml_diff>
--- a/trunk/PlusLib/docs/UsFidSegAlgo/Fiducial Pattern Recognition.pptx
+++ b/trunk/PlusLib/docs/UsFidSegAlgo/Fiducial Pattern Recognition.pptx
@@ -20,8 +20,9 @@
     <p:sldId id="268" r:id="rId14"/>
     <p:sldId id="269" r:id="rId15"/>
     <p:sldId id="270" r:id="rId16"/>
-    <p:sldId id="271" r:id="rId17"/>
-    <p:sldId id="272" r:id="rId18"/>
+    <p:sldId id="273" r:id="rId17"/>
+    <p:sldId id="271" r:id="rId18"/>
+    <p:sldId id="272" r:id="rId19"/>
   </p:sldIdLst>
   <p:sldSz cx="9144000" cy="6858000" type="screen4x3"/>
   <p:notesSz cx="6858000" cy="9144000"/>
@@ -8538,6 +8539,486 @@
           <a:chExt cx="0" cy="0"/>
         </a:xfrm>
       </p:grpSpPr>
+      <p:graphicFrame>
+        <p:nvGraphicFramePr>
+          <p:cNvPr id="4" name="Content Placeholder 3"/>
+          <p:cNvGraphicFramePr>
+            <a:graphicFrameLocks noGrp="1"/>
+          </p:cNvGraphicFramePr>
+          <p:nvPr>
+            <p:ph idx="1"/>
+            <p:extLst>
+              <p:ext uri="{D42A27DB-BD31-4B8C-83A1-F6EECF244321}">
+                <p14:modId xmlns:p14="http://schemas.microsoft.com/office/powerpoint/2010/main" val="258324647"/>
+              </p:ext>
+            </p:extLst>
+          </p:nvPr>
+        </p:nvGraphicFramePr>
+        <p:xfrm>
+          <a:off x="457200" y="2209800"/>
+          <a:ext cx="8229600" cy="2595880"/>
+        </p:xfrm>
+        <a:graphic>
+          <a:graphicData uri="http://schemas.openxmlformats.org/drawingml/2006/table">
+            <a:tbl>
+              <a:tblPr firstRow="1" bandRow="1">
+                <a:tableStyleId>{5C22544A-7EE6-4342-B048-85BDC9FD1C3A}</a:tableStyleId>
+              </a:tblPr>
+              <a:tblGrid>
+                <a:gridCol w="2743200"/>
+                <a:gridCol w="2743200"/>
+                <a:gridCol w="2743200"/>
+              </a:tblGrid>
+              <a:tr h="370840">
+                <a:tc>
+                  <a:txBody>
+                    <a:bodyPr/>
+                    <a:lstStyle/>
+                    <a:p>
+                      <a:pPr algn="ctr"/>
+                      <a:r>
+                        <a:rPr lang="en-US" sz="1400" dirty="0" smtClean="0"/>
+                        <a:t>Dataset</a:t>
+                      </a:r>
+                      <a:endParaRPr lang="en-US" sz="1400" dirty="0"/>
+                    </a:p>
+                  </a:txBody>
+                  <a:tcPr/>
+                </a:tc>
+                <a:tc>
+                  <a:txBody>
+                    <a:bodyPr/>
+                    <a:lstStyle/>
+                    <a:p>
+                      <a:pPr algn="ctr"/>
+                      <a:r>
+                        <a:rPr lang="en-US" sz="1400" dirty="0" smtClean="0"/>
+                        <a:t>Former algorithm runtime (s)</a:t>
+                      </a:r>
+                      <a:endParaRPr lang="en-US" sz="1400" dirty="0"/>
+                    </a:p>
+                  </a:txBody>
+                  <a:tcPr/>
+                </a:tc>
+                <a:tc>
+                  <a:txBody>
+                    <a:bodyPr/>
+                    <a:lstStyle/>
+                    <a:p>
+                      <a:pPr algn="ctr"/>
+                      <a:r>
+                        <a:rPr lang="en-US" sz="1400" dirty="0" smtClean="0"/>
+                        <a:t>New algorithm runtime (s)</a:t>
+                      </a:r>
+                      <a:endParaRPr lang="en-US" sz="1400" dirty="0"/>
+                    </a:p>
+                  </a:txBody>
+                  <a:tcPr/>
+                </a:tc>
+              </a:tr>
+              <a:tr h="370840">
+                <a:tc>
+                  <a:txBody>
+                    <a:bodyPr/>
+                    <a:lstStyle/>
+                    <a:p>
+                      <a:pPr algn="ctr"/>
+                      <a:r>
+                        <a:rPr lang="en-US" sz="1400" dirty="0" smtClean="0"/>
+                        <a:t>Translation</a:t>
+                      </a:r>
+                      <a:endParaRPr lang="en-US" sz="1400" dirty="0"/>
+                    </a:p>
+                  </a:txBody>
+                  <a:tcPr/>
+                </a:tc>
+                <a:tc>
+                  <a:txBody>
+                    <a:bodyPr/>
+                    <a:lstStyle/>
+                    <a:p>
+                      <a:pPr algn="ctr"/>
+                      <a:r>
+                        <a:rPr lang="en-US" sz="1400" dirty="0" smtClean="0"/>
+                        <a:t>7.04</a:t>
+                      </a:r>
+                      <a:endParaRPr lang="en-US" sz="1400" dirty="0"/>
+                    </a:p>
+                  </a:txBody>
+                  <a:tcPr/>
+                </a:tc>
+                <a:tc>
+                  <a:txBody>
+                    <a:bodyPr/>
+                    <a:lstStyle/>
+                    <a:p>
+                      <a:pPr algn="ctr"/>
+                      <a:r>
+                        <a:rPr lang="en-US" sz="1400" dirty="0" smtClean="0"/>
+                        <a:t>7.77</a:t>
+                      </a:r>
+                      <a:endParaRPr lang="en-US" sz="1400" dirty="0"/>
+                    </a:p>
+                  </a:txBody>
+                  <a:tcPr/>
+                </a:tc>
+              </a:tr>
+              <a:tr h="370840">
+                <a:tc>
+                  <a:txBody>
+                    <a:bodyPr/>
+                    <a:lstStyle/>
+                    <a:p>
+                      <a:pPr algn="ctr"/>
+                      <a:r>
+                        <a:rPr lang="en-US" sz="1400" dirty="0" smtClean="0"/>
+                        <a:t>Random stepper motion 1</a:t>
+                      </a:r>
+                      <a:endParaRPr lang="en-US" sz="1400" dirty="0"/>
+                    </a:p>
+                  </a:txBody>
+                  <a:tcPr/>
+                </a:tc>
+                <a:tc>
+                  <a:txBody>
+                    <a:bodyPr/>
+                    <a:lstStyle/>
+                    <a:p>
+                      <a:pPr algn="ctr"/>
+                      <a:r>
+                        <a:rPr lang="en-US" sz="1400" dirty="0" smtClean="0"/>
+                        <a:t>4.73</a:t>
+                      </a:r>
+                      <a:endParaRPr lang="en-US" sz="1400" dirty="0"/>
+                    </a:p>
+                  </a:txBody>
+                  <a:tcPr/>
+                </a:tc>
+                <a:tc>
+                  <a:txBody>
+                    <a:bodyPr/>
+                    <a:lstStyle/>
+                    <a:p>
+                      <a:pPr algn="ctr"/>
+                      <a:r>
+                        <a:rPr lang="en-US" sz="1400" dirty="0" smtClean="0"/>
+                        <a:t>4.96</a:t>
+                      </a:r>
+                      <a:endParaRPr lang="en-US" sz="1400" dirty="0"/>
+                    </a:p>
+                  </a:txBody>
+                  <a:tcPr/>
+                </a:tc>
+              </a:tr>
+              <a:tr h="370840">
+                <a:tc>
+                  <a:txBody>
+                    <a:bodyPr/>
+                    <a:lstStyle/>
+                    <a:p>
+                      <a:pPr algn="ctr"/>
+                      <a:r>
+                        <a:rPr lang="en-US" sz="1400" dirty="0" smtClean="0"/>
+                        <a:t>Random stepper motion 2</a:t>
+                      </a:r>
+                      <a:endParaRPr lang="en-US" sz="1400" dirty="0"/>
+                    </a:p>
+                  </a:txBody>
+                  <a:tcPr/>
+                </a:tc>
+                <a:tc>
+                  <a:txBody>
+                    <a:bodyPr/>
+                    <a:lstStyle/>
+                    <a:p>
+                      <a:pPr algn="ctr"/>
+                      <a:r>
+                        <a:rPr lang="en-US" sz="1400" dirty="0" smtClean="0"/>
+                        <a:t>2.28</a:t>
+                      </a:r>
+                      <a:endParaRPr lang="en-US" sz="1400" dirty="0"/>
+                    </a:p>
+                  </a:txBody>
+                  <a:tcPr/>
+                </a:tc>
+                <a:tc>
+                  <a:txBody>
+                    <a:bodyPr/>
+                    <a:lstStyle/>
+                    <a:p>
+                      <a:pPr algn="ctr"/>
+                      <a:r>
+                        <a:rPr lang="en-US" sz="1400" dirty="0" smtClean="0"/>
+                        <a:t>2.82</a:t>
+                      </a:r>
+                      <a:endParaRPr lang="en-US" sz="1400" dirty="0"/>
+                    </a:p>
+                  </a:txBody>
+                  <a:tcPr/>
+                </a:tc>
+              </a:tr>
+              <a:tr h="370840">
+                <a:tc>
+                  <a:txBody>
+                    <a:bodyPr/>
+                    <a:lstStyle/>
+                    <a:p>
+                      <a:pPr algn="ctr"/>
+                      <a:r>
+                        <a:rPr lang="en-US" sz="1400" dirty="0" smtClean="0"/>
+                        <a:t>Rotation 1</a:t>
+                      </a:r>
+                      <a:endParaRPr lang="en-US" sz="1400" dirty="0"/>
+                    </a:p>
+                  </a:txBody>
+                  <a:tcPr/>
+                </a:tc>
+                <a:tc>
+                  <a:txBody>
+                    <a:bodyPr/>
+                    <a:lstStyle/>
+                    <a:p>
+                      <a:pPr algn="ctr"/>
+                      <a:r>
+                        <a:rPr lang="en-US" sz="1400" dirty="0" smtClean="0"/>
+                        <a:t>20.25</a:t>
+                      </a:r>
+                      <a:endParaRPr lang="en-US" sz="1400" dirty="0"/>
+                    </a:p>
+                  </a:txBody>
+                  <a:tcPr/>
+                </a:tc>
+                <a:tc>
+                  <a:txBody>
+                    <a:bodyPr/>
+                    <a:lstStyle/>
+                    <a:p>
+                      <a:pPr algn="ctr"/>
+                      <a:r>
+                        <a:rPr lang="en-US" sz="1400" dirty="0" smtClean="0"/>
+                        <a:t>3.07</a:t>
+                      </a:r>
+                      <a:endParaRPr lang="en-US" sz="1400" dirty="0"/>
+                    </a:p>
+                  </a:txBody>
+                  <a:tcPr/>
+                </a:tc>
+              </a:tr>
+              <a:tr h="370840">
+                <a:tc>
+                  <a:txBody>
+                    <a:bodyPr/>
+                    <a:lstStyle/>
+                    <a:p>
+                      <a:pPr algn="ctr"/>
+                      <a:r>
+                        <a:rPr lang="en-US" sz="1400" dirty="0" smtClean="0"/>
+                        <a:t>Rotation 2</a:t>
+                      </a:r>
+                      <a:endParaRPr lang="en-US" sz="1400" dirty="0"/>
+                    </a:p>
+                  </a:txBody>
+                  <a:tcPr/>
+                </a:tc>
+                <a:tc>
+                  <a:txBody>
+                    <a:bodyPr/>
+                    <a:lstStyle/>
+                    <a:p>
+                      <a:pPr algn="ctr"/>
+                      <a:r>
+                        <a:rPr lang="en-US" sz="1400" dirty="0" smtClean="0"/>
+                        <a:t>3.57</a:t>
+                      </a:r>
+                      <a:endParaRPr lang="en-US" sz="1400" dirty="0"/>
+                    </a:p>
+                  </a:txBody>
+                  <a:tcPr/>
+                </a:tc>
+                <a:tc>
+                  <a:txBody>
+                    <a:bodyPr/>
+                    <a:lstStyle/>
+                    <a:p>
+                      <a:pPr algn="ctr"/>
+                      <a:r>
+                        <a:rPr lang="en-US" sz="1400" dirty="0" smtClean="0"/>
+                        <a:t>4.16</a:t>
+                      </a:r>
+                      <a:endParaRPr lang="en-US" sz="1400" dirty="0"/>
+                    </a:p>
+                  </a:txBody>
+                  <a:tcPr/>
+                </a:tc>
+              </a:tr>
+              <a:tr h="370840">
+                <a:tc>
+                  <a:txBody>
+                    <a:bodyPr/>
+                    <a:lstStyle/>
+                    <a:p>
+                      <a:pPr algn="ctr"/>
+                      <a:r>
+                        <a:rPr lang="en-US" sz="1400" dirty="0" smtClean="0"/>
+                        <a:t>CIRS phantom</a:t>
+                      </a:r>
+                      <a:r>
+                        <a:rPr lang="en-US" sz="1400" baseline="0" dirty="0" smtClean="0"/>
+                        <a:t> 045</a:t>
+                      </a:r>
+                      <a:endParaRPr lang="en-US" sz="1400" dirty="0"/>
+                    </a:p>
+                  </a:txBody>
+                  <a:tcPr/>
+                </a:tc>
+                <a:tc>
+                  <a:txBody>
+                    <a:bodyPr/>
+                    <a:lstStyle/>
+                    <a:p>
+                      <a:pPr algn="ctr"/>
+                      <a:r>
+                        <a:rPr lang="en-US" sz="1400" dirty="0" smtClean="0"/>
+                        <a:t>-</a:t>
+                      </a:r>
+                      <a:endParaRPr lang="en-US" sz="1400" dirty="0"/>
+                    </a:p>
+                  </a:txBody>
+                  <a:tcPr/>
+                </a:tc>
+                <a:tc>
+                  <a:txBody>
+                    <a:bodyPr/>
+                    <a:lstStyle/>
+                    <a:p>
+                      <a:pPr algn="ctr"/>
+                      <a:r>
+                        <a:rPr lang="en-US" sz="1400" dirty="0" smtClean="0"/>
+                        <a:t>2.15</a:t>
+                      </a:r>
+                      <a:endParaRPr lang="en-US" sz="1400" dirty="0"/>
+                    </a:p>
+                  </a:txBody>
+                  <a:tcPr/>
+                </a:tc>
+              </a:tr>
+            </a:tbl>
+          </a:graphicData>
+        </a:graphic>
+      </p:graphicFrame>
+      <p:sp>
+        <p:nvSpPr>
+          <p:cNvPr id="3" name="Title 2"/>
+          <p:cNvSpPr>
+            <a:spLocks noGrp="1"/>
+          </p:cNvSpPr>
+          <p:nvPr>
+            <p:ph type="title"/>
+          </p:nvPr>
+        </p:nvSpPr>
+        <p:spPr/>
+        <p:txBody>
+          <a:bodyPr/>
+          <a:lstStyle/>
+          <a:p>
+            <a:pPr algn="ctr"/>
+            <a:r>
+              <a:rPr lang="en-US" dirty="0" smtClean="0"/>
+              <a:t>Results</a:t>
+            </a:r>
+            <a:endParaRPr lang="en-US" dirty="0"/>
+          </a:p>
+        </p:txBody>
+      </p:sp>
+      <p:sp>
+        <p:nvSpPr>
+          <p:cNvPr id="5" name="TextBox 4"/>
+          <p:cNvSpPr txBox="1"/>
+          <p:nvPr/>
+        </p:nvSpPr>
+        <p:spPr>
+          <a:xfrm>
+            <a:off x="2485402" y="5334000"/>
+            <a:ext cx="4363695" cy="646331"/>
+          </a:xfrm>
+          <a:prstGeom prst="rect">
+            <a:avLst/>
+          </a:prstGeom>
+          <a:noFill/>
+        </p:spPr>
+        <p:txBody>
+          <a:bodyPr wrap="none" rtlCol="0">
+            <a:spAutoFit/>
+          </a:bodyPr>
+          <a:lstStyle/>
+          <a:p>
+            <a:pPr marL="285750" indent="-285750">
+              <a:buClr>
+                <a:schemeClr val="accent1"/>
+              </a:buClr>
+              <a:buSzPct val="150000"/>
+              <a:buFont typeface="Lucida Sans Unicode" pitchFamily="34" charset="0"/>
+              <a:buChar char="‣"/>
+            </a:pPr>
+            <a:r>
+              <a:rPr lang="en-US" dirty="0" smtClean="0"/>
+              <a:t>Slight slow down for most cases.</a:t>
+            </a:r>
+          </a:p>
+          <a:p>
+            <a:pPr marL="285750" indent="-285750">
+              <a:buClr>
+                <a:schemeClr val="accent1"/>
+              </a:buClr>
+              <a:buSzPct val="150000"/>
+              <a:buFont typeface="Lucida Sans Unicode" pitchFamily="34" charset="0"/>
+              <a:buChar char="‣"/>
+            </a:pPr>
+            <a:r>
+              <a:rPr lang="en-US" dirty="0" smtClean="0"/>
+              <a:t>Excellent speed-up for worst case.</a:t>
+            </a:r>
+            <a:endParaRPr lang="en-US" dirty="0"/>
+          </a:p>
+        </p:txBody>
+      </p:sp>
+    </p:spTree>
+    <p:extLst>
+      <p:ext uri="{BB962C8B-B14F-4D97-AF65-F5344CB8AC3E}">
+        <p14:creationId xmlns:p14="http://schemas.microsoft.com/office/powerpoint/2010/main" val="2505691756"/>
+      </p:ext>
+    </p:extLst>
+  </p:cSld>
+  <p:clrMapOvr>
+    <a:masterClrMapping/>
+  </p:clrMapOvr>
+  <p:timing>
+    <p:tnLst>
+      <p:par>
+        <p:cTn id="1" dur="indefinite" restart="never" nodeType="tmRoot"/>
+      </p:par>
+    </p:tnLst>
+  </p:timing>
+</p:sld>
+</file>
+
+<file path=ppt/slides/slide17.xml><?xml version="1.0" encoding="utf-8"?>
+<p:sld xmlns:a="http://schemas.openxmlformats.org/drawingml/2006/main" xmlns:r="http://schemas.openxmlformats.org/officeDocument/2006/relationships" xmlns:p="http://schemas.openxmlformats.org/presentationml/2006/main">
+  <p:cSld>
+    <p:spTree>
+      <p:nvGrpSpPr>
+        <p:cNvPr id="1" name=""/>
+        <p:cNvGrpSpPr/>
+        <p:nvPr/>
+      </p:nvGrpSpPr>
+      <p:grpSpPr>
+        <a:xfrm>
+          <a:off x="0" y="0"/>
+          <a:ext cx="0" cy="0"/>
+          <a:chOff x="0" y="0"/>
+          <a:chExt cx="0" cy="0"/>
+        </a:xfrm>
+      </p:grpSpPr>
       <p:sp>
         <p:nvSpPr>
           <p:cNvPr id="2" name="Content Placeholder 1"/>
@@ -8625,7 +9106,7 @@
 </p:sld>
 </file>
 
-<file path=ppt/slides/slide17.xml><?xml version="1.0" encoding="utf-8"?>
+<file path=ppt/slides/slide18.xml><?xml version="1.0" encoding="utf-8"?>
 <p:sld xmlns:a="http://schemas.openxmlformats.org/drawingml/2006/main" xmlns:r="http://schemas.openxmlformats.org/officeDocument/2006/relationships" xmlns:p="http://schemas.openxmlformats.org/presentationml/2006/main">
   <p:cSld>
     <p:spTree>

</xml_diff>